<commit_message>
Changed 'variable' to 'descriptor' in Fig 5
</commit_message>
<xml_diff>
--- a/manuscript/figure_5/figure_5_data_access.pptx
+++ b/manuscript/figure_5/figure_5_data_access.pptx
@@ -254,7 +254,7 @@
           <a:p>
             <a:fld id="{D223FB58-B929-BD4F-978F-875BA220C36B}" type="datetimeFigureOut">
               <a:rPr lang="en-US" smtClean="0"/>
-              <a:t>5/14/21</a:t>
+              <a:t>11/25/21</a:t>
             </a:fld>
             <a:endParaRPr lang="en-US"/>
           </a:p>
@@ -424,7 +424,7 @@
           <a:p>
             <a:fld id="{D223FB58-B929-BD4F-978F-875BA220C36B}" type="datetimeFigureOut">
               <a:rPr lang="en-US" smtClean="0"/>
-              <a:t>5/14/21</a:t>
+              <a:t>11/25/21</a:t>
             </a:fld>
             <a:endParaRPr lang="en-US"/>
           </a:p>
@@ -604,7 +604,7 @@
           <a:p>
             <a:fld id="{D223FB58-B929-BD4F-978F-875BA220C36B}" type="datetimeFigureOut">
               <a:rPr lang="en-US" smtClean="0"/>
-              <a:t>5/14/21</a:t>
+              <a:t>11/25/21</a:t>
             </a:fld>
             <a:endParaRPr lang="en-US"/>
           </a:p>
@@ -774,7 +774,7 @@
           <a:p>
             <a:fld id="{D223FB58-B929-BD4F-978F-875BA220C36B}" type="datetimeFigureOut">
               <a:rPr lang="en-US" smtClean="0"/>
-              <a:t>5/14/21</a:t>
+              <a:t>11/25/21</a:t>
             </a:fld>
             <a:endParaRPr lang="en-US"/>
           </a:p>
@@ -1018,7 +1018,7 @@
           <a:p>
             <a:fld id="{D223FB58-B929-BD4F-978F-875BA220C36B}" type="datetimeFigureOut">
               <a:rPr lang="en-US" smtClean="0"/>
-              <a:t>5/14/21</a:t>
+              <a:t>11/25/21</a:t>
             </a:fld>
             <a:endParaRPr lang="en-US"/>
           </a:p>
@@ -1250,7 +1250,7 @@
           <a:p>
             <a:fld id="{D223FB58-B929-BD4F-978F-875BA220C36B}" type="datetimeFigureOut">
               <a:rPr lang="en-US" smtClean="0"/>
-              <a:t>5/14/21</a:t>
+              <a:t>11/25/21</a:t>
             </a:fld>
             <a:endParaRPr lang="en-US"/>
           </a:p>
@@ -1617,7 +1617,7 @@
           <a:p>
             <a:fld id="{D223FB58-B929-BD4F-978F-875BA220C36B}" type="datetimeFigureOut">
               <a:rPr lang="en-US" smtClean="0"/>
-              <a:t>5/14/21</a:t>
+              <a:t>11/25/21</a:t>
             </a:fld>
             <a:endParaRPr lang="en-US"/>
           </a:p>
@@ -1735,7 +1735,7 @@
           <a:p>
             <a:fld id="{D223FB58-B929-BD4F-978F-875BA220C36B}" type="datetimeFigureOut">
               <a:rPr lang="en-US" smtClean="0"/>
-              <a:t>5/14/21</a:t>
+              <a:t>11/25/21</a:t>
             </a:fld>
             <a:endParaRPr lang="en-US"/>
           </a:p>
@@ -1830,7 +1830,7 @@
           <a:p>
             <a:fld id="{D223FB58-B929-BD4F-978F-875BA220C36B}" type="datetimeFigureOut">
               <a:rPr lang="en-US" smtClean="0"/>
-              <a:t>5/14/21</a:t>
+              <a:t>11/25/21</a:t>
             </a:fld>
             <a:endParaRPr lang="en-US"/>
           </a:p>
@@ -2107,7 +2107,7 @@
           <a:p>
             <a:fld id="{D223FB58-B929-BD4F-978F-875BA220C36B}" type="datetimeFigureOut">
               <a:rPr lang="en-US" smtClean="0"/>
-              <a:t>5/14/21</a:t>
+              <a:t>11/25/21</a:t>
             </a:fld>
             <a:endParaRPr lang="en-US"/>
           </a:p>
@@ -2364,7 +2364,7 @@
           <a:p>
             <a:fld id="{D223FB58-B929-BD4F-978F-875BA220C36B}" type="datetimeFigureOut">
               <a:rPr lang="en-US" smtClean="0"/>
-              <a:t>5/14/21</a:t>
+              <a:t>11/25/21</a:t>
             </a:fld>
             <a:endParaRPr lang="en-US"/>
           </a:p>
@@ -2577,7 +2577,7 @@
           <a:p>
             <a:fld id="{D223FB58-B929-BD4F-978F-875BA220C36B}" type="datetimeFigureOut">
               <a:rPr lang="en-US" smtClean="0"/>
-              <a:t>5/14/21</a:t>
+              <a:t>11/25/21</a:t>
             </a:fld>
             <a:endParaRPr lang="en-US"/>
           </a:p>
@@ -3326,7 +3326,7 @@
                 </a:solidFill>
                 <a:latin typeface="Helvetica" pitchFamily="2" charset="0"/>
               </a:rPr>
-              <a:t>Identify variable(s) of interest</a:t>
+              <a:t>Identify descriptor(s) of interest</a:t>
             </a:r>
           </a:p>
         </p:txBody>
@@ -3386,7 +3386,7 @@
                 </a:solidFill>
                 <a:latin typeface="Helvetica" pitchFamily="2" charset="0"/>
               </a:rPr>
-              <a:t>Download variable(s) from </a:t>
+              <a:t>Download descriptor(s) from </a:t>
             </a:r>
             <a:r>
               <a:rPr lang="en-US" sz="1200" dirty="0" err="1">

</xml_diff>